<commit_message>
update hardware overview image
</commit_message>
<xml_diff>
--- a/img/New Microsoft PowerPoint 演示文稿.pptx
+++ b/img/New Microsoft PowerPoint 演示文稿.pptx
@@ -6,6 +6,7 @@
   </p:sldMasterIdLst>
   <p:sldIdLst>
     <p:sldId id="256" r:id="rId2"/>
+    <p:sldId id="257" r:id="rId3"/>
   </p:sldIdLst>
   <p:sldSz cx="12192000" cy="6858000"/>
   <p:notesSz cx="6858000" cy="9144000"/>
@@ -3047,6 +3048,321 @@
 </p:sld>
 </file>
 
+<file path=ppt/slides/slide2.xml><?xml version="1.0" encoding="utf-8"?>
+<p:sld xmlns:a="http://schemas.openxmlformats.org/drawingml/2006/main" xmlns:r="http://schemas.openxmlformats.org/officeDocument/2006/relationships" xmlns:p="http://schemas.openxmlformats.org/presentationml/2006/main">
+  <p:cSld>
+    <p:spTree>
+      <p:nvGrpSpPr>
+        <p:cNvPr id="1" name=""/>
+        <p:cNvGrpSpPr/>
+        <p:nvPr/>
+      </p:nvGrpSpPr>
+      <p:grpSpPr>
+        <a:xfrm>
+          <a:off x="0" y="0"/>
+          <a:ext cx="0" cy="0"/>
+          <a:chOff x="0" y="0"/>
+          <a:chExt cx="0" cy="0"/>
+        </a:xfrm>
+      </p:grpSpPr>
+      <p:pic>
+        <p:nvPicPr>
+          <p:cNvPr id="4" name="图片 3"/>
+          <p:cNvPicPr>
+            <a:picLocks noChangeAspect="1"/>
+          </p:cNvPicPr>
+          <p:nvPr/>
+        </p:nvPicPr>
+        <p:blipFill>
+          <a:blip r:embed="rId2">
+            <a:extLst>
+              <a:ext uri="{28A0092B-C50C-407E-A947-70E740481C1C}">
+                <a14:useLocalDpi xmlns:a14="http://schemas.microsoft.com/office/drawing/2010/main" val="0"/>
+              </a:ext>
+            </a:extLst>
+          </a:blip>
+          <a:stretch>
+            <a:fillRect/>
+          </a:stretch>
+        </p:blipFill>
+        <p:spPr>
+          <a:xfrm>
+            <a:off x="2919977" y="1627628"/>
+            <a:ext cx="6352045" cy="3602743"/>
+          </a:xfrm>
+          <a:prstGeom prst="rect">
+            <a:avLst/>
+          </a:prstGeom>
+        </p:spPr>
+      </p:pic>
+      <p:sp>
+        <p:nvSpPr>
+          <p:cNvPr id="5" name="椭圆 4"/>
+          <p:cNvSpPr/>
+          <p:nvPr/>
+        </p:nvSpPr>
+        <p:spPr>
+          <a:xfrm>
+            <a:off x="4233553" y="3317834"/>
+            <a:ext cx="402771" cy="402771"/>
+          </a:xfrm>
+          <a:prstGeom prst="ellipse">
+            <a:avLst/>
+          </a:prstGeom>
+          <a:solidFill>
+            <a:schemeClr val="accent2"/>
+          </a:solidFill>
+          <a:ln w="28575">
+            <a:solidFill>
+              <a:schemeClr val="bg1"/>
+            </a:solidFill>
+          </a:ln>
+        </p:spPr>
+        <p:style>
+          <a:lnRef idx="2">
+            <a:schemeClr val="accent1">
+              <a:shade val="50000"/>
+            </a:schemeClr>
+          </a:lnRef>
+          <a:fillRef idx="1">
+            <a:schemeClr val="accent1"/>
+          </a:fillRef>
+          <a:effectRef idx="0">
+            <a:schemeClr val="accent1"/>
+          </a:effectRef>
+          <a:fontRef idx="minor">
+            <a:schemeClr val="lt1"/>
+          </a:fontRef>
+        </p:style>
+        <p:txBody>
+          <a:bodyPr rtlCol="0" anchor="ctr"/>
+          <a:lstStyle/>
+          <a:p>
+            <a:pPr algn="ctr"/>
+            <a:r>
+              <a:rPr lang="en-US" dirty="0"/>
+              <a:t>1</a:t>
+            </a:r>
+          </a:p>
+        </p:txBody>
+      </p:sp>
+      <p:sp>
+        <p:nvSpPr>
+          <p:cNvPr id="6" name="椭圆 5"/>
+          <p:cNvSpPr/>
+          <p:nvPr/>
+        </p:nvSpPr>
+        <p:spPr>
+          <a:xfrm>
+            <a:off x="3416135" y="4181434"/>
+            <a:ext cx="402771" cy="402771"/>
+          </a:xfrm>
+          <a:prstGeom prst="ellipse">
+            <a:avLst/>
+          </a:prstGeom>
+          <a:solidFill>
+            <a:schemeClr val="accent2"/>
+          </a:solidFill>
+          <a:ln w="28575">
+            <a:solidFill>
+              <a:schemeClr val="bg1"/>
+            </a:solidFill>
+          </a:ln>
+        </p:spPr>
+        <p:style>
+          <a:lnRef idx="2">
+            <a:schemeClr val="accent1">
+              <a:shade val="50000"/>
+            </a:schemeClr>
+          </a:lnRef>
+          <a:fillRef idx="1">
+            <a:schemeClr val="accent1"/>
+          </a:fillRef>
+          <a:effectRef idx="0">
+            <a:schemeClr val="accent1"/>
+          </a:effectRef>
+          <a:fontRef idx="minor">
+            <a:schemeClr val="lt1"/>
+          </a:fontRef>
+        </p:style>
+        <p:txBody>
+          <a:bodyPr rtlCol="0" anchor="ctr"/>
+          <a:lstStyle/>
+          <a:p>
+            <a:pPr algn="ctr"/>
+            <a:r>
+              <a:rPr lang="en-US" dirty="0"/>
+              <a:t>2</a:t>
+            </a:r>
+          </a:p>
+        </p:txBody>
+      </p:sp>
+      <p:sp>
+        <p:nvSpPr>
+          <p:cNvPr id="7" name="椭圆 6"/>
+          <p:cNvSpPr/>
+          <p:nvPr/>
+        </p:nvSpPr>
+        <p:spPr>
+          <a:xfrm>
+            <a:off x="4515262" y="4181433"/>
+            <a:ext cx="402771" cy="402771"/>
+          </a:xfrm>
+          <a:prstGeom prst="ellipse">
+            <a:avLst/>
+          </a:prstGeom>
+          <a:solidFill>
+            <a:schemeClr val="accent2"/>
+          </a:solidFill>
+          <a:ln w="28575">
+            <a:solidFill>
+              <a:schemeClr val="bg1"/>
+            </a:solidFill>
+          </a:ln>
+        </p:spPr>
+        <p:style>
+          <a:lnRef idx="2">
+            <a:schemeClr val="accent1">
+              <a:shade val="50000"/>
+            </a:schemeClr>
+          </a:lnRef>
+          <a:fillRef idx="1">
+            <a:schemeClr val="accent1"/>
+          </a:fillRef>
+          <a:effectRef idx="0">
+            <a:schemeClr val="accent1"/>
+          </a:effectRef>
+          <a:fontRef idx="minor">
+            <a:schemeClr val="lt1"/>
+          </a:fontRef>
+        </p:style>
+        <p:txBody>
+          <a:bodyPr rtlCol="0" anchor="ctr"/>
+          <a:lstStyle/>
+          <a:p>
+            <a:pPr algn="ctr"/>
+            <a:r>
+              <a:rPr lang="en-US" dirty="0"/>
+              <a:t>3</a:t>
+            </a:r>
+          </a:p>
+        </p:txBody>
+      </p:sp>
+      <p:sp>
+        <p:nvSpPr>
+          <p:cNvPr id="8" name="椭圆 7"/>
+          <p:cNvSpPr/>
+          <p:nvPr/>
+        </p:nvSpPr>
+        <p:spPr>
+          <a:xfrm>
+            <a:off x="6270171" y="3079172"/>
+            <a:ext cx="402771" cy="402771"/>
+          </a:xfrm>
+          <a:prstGeom prst="ellipse">
+            <a:avLst/>
+          </a:prstGeom>
+          <a:solidFill>
+            <a:schemeClr val="accent2"/>
+          </a:solidFill>
+          <a:ln w="28575">
+            <a:solidFill>
+              <a:schemeClr val="bg1"/>
+            </a:solidFill>
+          </a:ln>
+        </p:spPr>
+        <p:style>
+          <a:lnRef idx="2">
+            <a:schemeClr val="accent1">
+              <a:shade val="50000"/>
+            </a:schemeClr>
+          </a:lnRef>
+          <a:fillRef idx="1">
+            <a:schemeClr val="accent1"/>
+          </a:fillRef>
+          <a:effectRef idx="0">
+            <a:schemeClr val="accent1"/>
+          </a:effectRef>
+          <a:fontRef idx="minor">
+            <a:schemeClr val="lt1"/>
+          </a:fontRef>
+        </p:style>
+        <p:txBody>
+          <a:bodyPr rtlCol="0" anchor="ctr"/>
+          <a:lstStyle/>
+          <a:p>
+            <a:pPr algn="ctr"/>
+            <a:r>
+              <a:rPr lang="en-US" dirty="0"/>
+              <a:t>4</a:t>
+            </a:r>
+          </a:p>
+        </p:txBody>
+      </p:sp>
+      <p:sp>
+        <p:nvSpPr>
+          <p:cNvPr id="9" name="椭圆 8"/>
+          <p:cNvSpPr/>
+          <p:nvPr/>
+        </p:nvSpPr>
+        <p:spPr>
+          <a:xfrm>
+            <a:off x="7812840" y="3317833"/>
+            <a:ext cx="402771" cy="402771"/>
+          </a:xfrm>
+          <a:prstGeom prst="ellipse">
+            <a:avLst/>
+          </a:prstGeom>
+          <a:solidFill>
+            <a:schemeClr val="accent2"/>
+          </a:solidFill>
+          <a:ln w="28575">
+            <a:solidFill>
+              <a:schemeClr val="bg1"/>
+            </a:solidFill>
+          </a:ln>
+        </p:spPr>
+        <p:style>
+          <a:lnRef idx="2">
+            <a:schemeClr val="accent1">
+              <a:shade val="50000"/>
+            </a:schemeClr>
+          </a:lnRef>
+          <a:fillRef idx="1">
+            <a:schemeClr val="accent1"/>
+          </a:fillRef>
+          <a:effectRef idx="0">
+            <a:schemeClr val="accent1"/>
+          </a:effectRef>
+          <a:fontRef idx="minor">
+            <a:schemeClr val="lt1"/>
+          </a:fontRef>
+        </p:style>
+        <p:txBody>
+          <a:bodyPr rtlCol="0" anchor="ctr"/>
+          <a:lstStyle/>
+          <a:p>
+            <a:pPr algn="ctr"/>
+            <a:r>
+              <a:rPr lang="en-US" dirty="0"/>
+              <a:t>5</a:t>
+            </a:r>
+          </a:p>
+        </p:txBody>
+      </p:sp>
+    </p:spTree>
+    <p:extLst>
+      <p:ext uri="{BB962C8B-B14F-4D97-AF65-F5344CB8AC3E}">
+        <p14:creationId xmlns:p14="http://schemas.microsoft.com/office/powerpoint/2010/main" val="3091827153"/>
+      </p:ext>
+    </p:extLst>
+  </p:cSld>
+  <p:clrMapOvr>
+    <a:masterClrMapping/>
+  </p:clrMapOvr>
+</p:sld>
+</file>
+
 <file path=ppt/theme/theme1.xml><?xml version="1.0" encoding="utf-8"?>
 <a:theme xmlns:a="http://schemas.openxmlformats.org/drawingml/2006/main" name="Office 主题​​">
   <a:themeElements>

</xml_diff>